<commit_message>
Refactored code fixing items listed in Issue #22
</commit_message>
<xml_diff>
--- a/solutions/firewall-manager/firewall-manager-org/documentation/Organization-Firewall-Manager-Architecture.pptx
+++ b/solutions/firewall-manager/firewall-manager-org/documentation/Organization-Firewall-Manager-Architecture.pptx
@@ -197,7 +197,7 @@
           <a:p>
             <a:fld id="{FD8D84E3-00BA-4A46-8256-7E527D8B4480}" type="datetimeFigureOut">
               <a:rPr lang="en-US" smtClean="0"/>
-              <a:t>9/22/20</a:t>
+              <a:t>4/28/21</a:t>
             </a:fld>
             <a:endParaRPr lang="en-US"/>
           </a:p>
@@ -695,7 +695,7 @@
           <a:p>
             <a:fld id="{9FE185F7-9B28-9F45-9F43-9CB5A0B99390}" type="datetimeFigureOut">
               <a:rPr lang="en-US" smtClean="0"/>
-              <a:t>9/22/20</a:t>
+              <a:t>4/28/21</a:t>
             </a:fld>
             <a:endParaRPr lang="en-US"/>
           </a:p>
@@ -893,7 +893,7 @@
           <a:p>
             <a:fld id="{9FE185F7-9B28-9F45-9F43-9CB5A0B99390}" type="datetimeFigureOut">
               <a:rPr lang="en-US" smtClean="0"/>
-              <a:t>9/22/20</a:t>
+              <a:t>4/28/21</a:t>
             </a:fld>
             <a:endParaRPr lang="en-US"/>
           </a:p>
@@ -1101,7 +1101,7 @@
           <a:p>
             <a:fld id="{9FE185F7-9B28-9F45-9F43-9CB5A0B99390}" type="datetimeFigureOut">
               <a:rPr lang="en-US" smtClean="0"/>
-              <a:t>9/22/20</a:t>
+              <a:t>4/28/21</a:t>
             </a:fld>
             <a:endParaRPr lang="en-US"/>
           </a:p>
@@ -1299,7 +1299,7 @@
           <a:p>
             <a:fld id="{9FE185F7-9B28-9F45-9F43-9CB5A0B99390}" type="datetimeFigureOut">
               <a:rPr lang="en-US" smtClean="0"/>
-              <a:t>9/22/20</a:t>
+              <a:t>4/28/21</a:t>
             </a:fld>
             <a:endParaRPr lang="en-US"/>
           </a:p>
@@ -1574,7 +1574,7 @@
           <a:p>
             <a:fld id="{9FE185F7-9B28-9F45-9F43-9CB5A0B99390}" type="datetimeFigureOut">
               <a:rPr lang="en-US" smtClean="0"/>
-              <a:t>9/22/20</a:t>
+              <a:t>4/28/21</a:t>
             </a:fld>
             <a:endParaRPr lang="en-US"/>
           </a:p>
@@ -1839,7 +1839,7 @@
           <a:p>
             <a:fld id="{9FE185F7-9B28-9F45-9F43-9CB5A0B99390}" type="datetimeFigureOut">
               <a:rPr lang="en-US" smtClean="0"/>
-              <a:t>9/22/20</a:t>
+              <a:t>4/28/21</a:t>
             </a:fld>
             <a:endParaRPr lang="en-US"/>
           </a:p>
@@ -2251,7 +2251,7 @@
           <a:p>
             <a:fld id="{9FE185F7-9B28-9F45-9F43-9CB5A0B99390}" type="datetimeFigureOut">
               <a:rPr lang="en-US" smtClean="0"/>
-              <a:t>9/22/20</a:t>
+              <a:t>4/28/21</a:t>
             </a:fld>
             <a:endParaRPr lang="en-US"/>
           </a:p>
@@ -2392,7 +2392,7 @@
           <a:p>
             <a:fld id="{9FE185F7-9B28-9F45-9F43-9CB5A0B99390}" type="datetimeFigureOut">
               <a:rPr lang="en-US" smtClean="0"/>
-              <a:t>9/22/20</a:t>
+              <a:t>4/28/21</a:t>
             </a:fld>
             <a:endParaRPr lang="en-US"/>
           </a:p>
@@ -2505,7 +2505,7 @@
           <a:p>
             <a:fld id="{9FE185F7-9B28-9F45-9F43-9CB5A0B99390}" type="datetimeFigureOut">
               <a:rPr lang="en-US" smtClean="0"/>
-              <a:t>9/22/20</a:t>
+              <a:t>4/28/21</a:t>
             </a:fld>
             <a:endParaRPr lang="en-US"/>
           </a:p>
@@ -2816,7 +2816,7 @@
           <a:p>
             <a:fld id="{9FE185F7-9B28-9F45-9F43-9CB5A0B99390}" type="datetimeFigureOut">
               <a:rPr lang="en-US" smtClean="0"/>
-              <a:t>9/22/20</a:t>
+              <a:t>4/28/21</a:t>
             </a:fld>
             <a:endParaRPr lang="en-US"/>
           </a:p>
@@ -3104,7 +3104,7 @@
           <a:p>
             <a:fld id="{9FE185F7-9B28-9F45-9F43-9CB5A0B99390}" type="datetimeFigureOut">
               <a:rPr lang="en-US" smtClean="0"/>
-              <a:t>9/22/20</a:t>
+              <a:t>4/28/21</a:t>
             </a:fld>
             <a:endParaRPr lang="en-US"/>
           </a:p>
@@ -3345,7 +3345,7 @@
           <a:p>
             <a:fld id="{9FE185F7-9B28-9F45-9F43-9CB5A0B99390}" type="datetimeFigureOut">
               <a:rPr lang="en-US" smtClean="0"/>
-              <a:t>9/22/20</a:t>
+              <a:t>4/28/21</a:t>
             </a:fld>
             <a:endParaRPr lang="en-US"/>
           </a:p>
@@ -3782,11 +3782,7 @@
           <a:prstGeom prst="rect">
             <a:avLst/>
           </a:prstGeom>
-          <a:solidFill>
-            <a:srgbClr val="5A6B86">
-              <a:alpha val="9804"/>
-            </a:srgbClr>
-          </a:solidFill>
+          <a:noFill/>
           <a:ln w="12700">
             <a:solidFill>
               <a:srgbClr val="002060"/>
@@ -4014,7 +4010,7 @@
         </p:blipFill>
         <p:spPr>
           <a:xfrm>
-            <a:off x="2113804" y="97853"/>
+            <a:off x="2042556" y="243634"/>
             <a:ext cx="330200" cy="330200"/>
           </a:xfrm>
           <a:prstGeom prst="rect">
@@ -4042,11 +4038,7 @@
           <a:prstGeom prst="rect">
             <a:avLst/>
           </a:prstGeom>
-          <a:solidFill>
-            <a:srgbClr val="5A6B86">
-              <a:alpha val="9804"/>
-            </a:srgbClr>
-          </a:solidFill>
+          <a:noFill/>
           <a:ln w="12700">
             <a:solidFill>
               <a:srgbClr val="002060"/>
@@ -4116,7 +4108,7 @@
         </p:nvSpPr>
         <p:spPr>
           <a:xfrm>
-            <a:off x="7655768" y="1651564"/>
+            <a:off x="7597400" y="1651564"/>
             <a:ext cx="809602" cy="461665"/>
           </a:xfrm>
           <a:prstGeom prst="rect">
@@ -4152,7 +4144,7 @@
         </p:nvSpPr>
         <p:spPr>
           <a:xfrm>
-            <a:off x="5374361" y="1744232"/>
+            <a:off x="5315993" y="1744232"/>
             <a:ext cx="1427732" cy="276999"/>
           </a:xfrm>
           <a:prstGeom prst="rect">
@@ -4280,7 +4272,7 @@
         </p:blipFill>
         <p:spPr>
           <a:xfrm>
-            <a:off x="5833458" y="2419741"/>
+            <a:off x="5775090" y="2419741"/>
             <a:ext cx="555156" cy="555156"/>
           </a:xfrm>
           <a:prstGeom prst="rect">
@@ -4302,7 +4294,7 @@
         </p:nvSpPr>
         <p:spPr>
           <a:xfrm>
-            <a:off x="5329035" y="2974897"/>
+            <a:off x="5270667" y="2974897"/>
             <a:ext cx="1578705" cy="461665"/>
           </a:xfrm>
           <a:prstGeom prst="rect">
@@ -4430,7 +4422,7 @@
         </p:blipFill>
         <p:spPr>
           <a:xfrm>
-            <a:off x="5810649" y="1150063"/>
+            <a:off x="5752281" y="1150063"/>
             <a:ext cx="555156" cy="555156"/>
           </a:xfrm>
           <a:prstGeom prst="rect">
@@ -4452,7 +4444,7 @@
         </p:nvSpPr>
         <p:spPr>
           <a:xfrm>
-            <a:off x="6562779" y="2213042"/>
+            <a:off x="6504411" y="2213042"/>
             <a:ext cx="1103001" cy="276999"/>
           </a:xfrm>
           <a:prstGeom prst="rect">
@@ -4502,7 +4494,7 @@
         </p:blipFill>
         <p:spPr>
           <a:xfrm>
-            <a:off x="6837385" y="1812225"/>
+            <a:off x="6779017" y="1812225"/>
             <a:ext cx="469900" cy="469900"/>
           </a:xfrm>
           <a:prstGeom prst="rect">
@@ -4526,7 +4518,7 @@
         </p:nvCxnSpPr>
         <p:spPr>
           <a:xfrm>
-            <a:off x="6686857" y="1430284"/>
+            <a:off x="6628489" y="1430284"/>
             <a:ext cx="835165" cy="0"/>
           </a:xfrm>
           <a:prstGeom prst="straightConnector1">
@@ -4571,7 +4563,7 @@
         </p:nvCxnSpPr>
         <p:spPr>
           <a:xfrm>
-            <a:off x="6082534" y="1986744"/>
+            <a:off x="6024166" y="1986744"/>
             <a:ext cx="0" cy="356001"/>
           </a:xfrm>
           <a:prstGeom prst="straightConnector1">
@@ -4614,8 +4606,8 @@
         </p:nvSpPr>
         <p:spPr>
           <a:xfrm>
-            <a:off x="3355785" y="2222095"/>
-            <a:ext cx="1307240" cy="461665"/>
+            <a:off x="3338457" y="2252321"/>
+            <a:ext cx="1209706" cy="461665"/>
           </a:xfrm>
           <a:prstGeom prst="rect">
             <a:avLst/>
@@ -4664,7 +4656,7 @@
         </p:blipFill>
         <p:spPr>
           <a:xfrm>
-            <a:off x="3731827" y="1633701"/>
+            <a:off x="3660774" y="1692162"/>
             <a:ext cx="555156" cy="555156"/>
           </a:xfrm>
           <a:prstGeom prst="rect">
@@ -4686,8 +4678,8 @@
         </p:nvSpPr>
         <p:spPr>
           <a:xfrm>
-            <a:off x="5420547" y="1062201"/>
-            <a:ext cx="3530528" cy="2372158"/>
+            <a:off x="4894360" y="1062201"/>
+            <a:ext cx="4056715" cy="2372158"/>
           </a:xfrm>
           <a:prstGeom prst="rect">
             <a:avLst/>
@@ -4750,7 +4742,7 @@
         </p:nvCxnSpPr>
         <p:spPr>
           <a:xfrm>
-            <a:off x="4598118" y="1923015"/>
+            <a:off x="4271803" y="1911769"/>
             <a:ext cx="486285" cy="0"/>
           </a:xfrm>
           <a:prstGeom prst="straightConnector1">
@@ -5044,7 +5036,7 @@
         </p:nvSpPr>
         <p:spPr>
           <a:xfrm>
-            <a:off x="3317391" y="589377"/>
+            <a:off x="3684917" y="633224"/>
             <a:ext cx="253435" cy="212902"/>
           </a:xfrm>
           <a:prstGeom prst="ellipse">
@@ -5096,7 +5088,7 @@
         </p:nvSpPr>
         <p:spPr>
           <a:xfrm>
-            <a:off x="3744358" y="1640406"/>
+            <a:off x="3673305" y="1698867"/>
             <a:ext cx="253435" cy="212902"/>
           </a:xfrm>
           <a:prstGeom prst="ellipse">
@@ -5148,7 +5140,7 @@
         </p:nvSpPr>
         <p:spPr>
           <a:xfrm>
-            <a:off x="5810649" y="1150136"/>
+            <a:off x="5752281" y="1150136"/>
             <a:ext cx="253435" cy="212902"/>
           </a:xfrm>
           <a:prstGeom prst="ellipse">
@@ -5214,7 +5206,7 @@
         </p:blipFill>
         <p:spPr>
           <a:xfrm>
-            <a:off x="7786985" y="1118619"/>
+            <a:off x="7728617" y="1118619"/>
             <a:ext cx="550098" cy="550098"/>
           </a:xfrm>
           <a:prstGeom prst="rect">
@@ -5236,7 +5228,7 @@
         </p:nvSpPr>
         <p:spPr>
           <a:xfrm>
-            <a:off x="6962752" y="1661970"/>
+            <a:off x="6904384" y="1661970"/>
             <a:ext cx="253435" cy="212902"/>
           </a:xfrm>
           <a:prstGeom prst="ellipse">
@@ -5288,7 +5280,7 @@
         </p:nvSpPr>
         <p:spPr>
           <a:xfrm>
-            <a:off x="5848765" y="2425716"/>
+            <a:off x="5790397" y="2425716"/>
             <a:ext cx="253435" cy="212902"/>
           </a:xfrm>
           <a:prstGeom prst="ellipse">
@@ -5340,7 +5332,7 @@
         </p:nvSpPr>
         <p:spPr>
           <a:xfrm>
-            <a:off x="7799787" y="1125292"/>
+            <a:off x="7741419" y="1125292"/>
             <a:ext cx="253435" cy="212902"/>
           </a:xfrm>
           <a:prstGeom prst="ellipse">
@@ -5392,7 +5384,7 @@
         </p:nvSpPr>
         <p:spPr>
           <a:xfrm>
-            <a:off x="3301961" y="3647008"/>
+            <a:off x="3659976" y="3688992"/>
             <a:ext cx="253435" cy="212902"/>
           </a:xfrm>
           <a:prstGeom prst="ellipse">
@@ -5663,7 +5655,7 @@
               <a:rPr lang="en-US" sz="1200" dirty="0">
                 <a:ln w="0"/>
                 <a:solidFill>
-                  <a:schemeClr val="accent5"/>
+                  <a:srgbClr val="002060"/>
                 </a:solidFill>
               </a:rPr>
               <a:t>VPC</a:t>
@@ -5875,6 +5867,78 @@
           </a:p>
         </p:txBody>
       </p:sp>
+      <p:pic>
+        <p:nvPicPr>
+          <p:cNvPr id="42" name="Graphic 2">
+            <a:extLst>
+              <a:ext uri="{FF2B5EF4-FFF2-40B4-BE49-F238E27FC236}">
+                <a16:creationId xmlns:a16="http://schemas.microsoft.com/office/drawing/2014/main" id="{5F88CC2D-34DF-CA4D-9FDD-8AAC1BDA4C2F}"/>
+              </a:ext>
+            </a:extLst>
+          </p:cNvPr>
+          <p:cNvPicPr>
+            <a:picLocks noChangeAspect="1"/>
+          </p:cNvPicPr>
+          <p:nvPr/>
+        </p:nvPicPr>
+        <p:blipFill>
+          <a:blip r:embed="rId3">
+            <a:extLst>
+              <a:ext uri="{96DAC541-7B7A-43D3-8B79-37D633B846F1}">
+                <asvg:svgBlip xmlns:asvg="http://schemas.microsoft.com/office/drawing/2016/SVG/main" r:embed="rId4"/>
+              </a:ext>
+            </a:extLst>
+          </a:blip>
+          <a:stretch>
+            <a:fillRect/>
+          </a:stretch>
+        </p:blipFill>
+        <p:spPr>
+          <a:xfrm>
+            <a:off x="3285700" y="571539"/>
+            <a:ext cx="330200" cy="330200"/>
+          </a:xfrm>
+          <a:prstGeom prst="rect">
+            <a:avLst/>
+          </a:prstGeom>
+        </p:spPr>
+      </p:pic>
+      <p:pic>
+        <p:nvPicPr>
+          <p:cNvPr id="43" name="Graphic 2">
+            <a:extLst>
+              <a:ext uri="{FF2B5EF4-FFF2-40B4-BE49-F238E27FC236}">
+                <a16:creationId xmlns:a16="http://schemas.microsoft.com/office/drawing/2014/main" id="{760AE894-0FC4-3A4D-A4D6-C48E7437340D}"/>
+              </a:ext>
+            </a:extLst>
+          </p:cNvPr>
+          <p:cNvPicPr>
+            <a:picLocks noChangeAspect="1"/>
+          </p:cNvPicPr>
+          <p:nvPr/>
+        </p:nvPicPr>
+        <p:blipFill>
+          <a:blip r:embed="rId3">
+            <a:extLst>
+              <a:ext uri="{96DAC541-7B7A-43D3-8B79-37D633B846F1}">
+                <asvg:svgBlip xmlns:asvg="http://schemas.microsoft.com/office/drawing/2016/SVG/main" r:embed="rId4"/>
+              </a:ext>
+            </a:extLst>
+          </a:blip>
+          <a:stretch>
+            <a:fillRect/>
+          </a:stretch>
+        </p:blipFill>
+        <p:spPr>
+          <a:xfrm>
+            <a:off x="3275972" y="3629162"/>
+            <a:ext cx="330200" cy="330200"/>
+          </a:xfrm>
+          <a:prstGeom prst="rect">
+            <a:avLst/>
+          </a:prstGeom>
+        </p:spPr>
+      </p:pic>
     </p:spTree>
     <p:extLst>
       <p:ext uri="{BB962C8B-B14F-4D97-AF65-F5344CB8AC3E}">

</xml_diff>